<commit_message>
rotated bent vs straight
</commit_message>
<xml_diff>
--- a/RA-L Hetro Sensors/pictures/StraightvsBent_overview.pptx
+++ b/RA-L Hetro Sensors/pictures/StraightvsBent_overview.pptx
@@ -7,7 +7,7 @@
   <p:sldIdLst>
     <p:sldId id="256" r:id="rId2"/>
   </p:sldIdLst>
-  <p:sldSz cx="4479925" cy="5303838"/>
+  <p:sldSz cx="4479925" cy="3657600"/>
   <p:notesSz cx="6858000" cy="9144000"/>
   <p:defaultTextStyle>
     <a:defPPr>
@@ -136,8 +136,8 @@
         </p:nvSpPr>
         <p:spPr>
           <a:xfrm>
-            <a:off x="335995" y="868013"/>
-            <a:ext cx="3807936" cy="1846521"/>
+            <a:off x="335995" y="598594"/>
+            <a:ext cx="3807936" cy="1273386"/>
           </a:xfrm>
         </p:spPr>
         <p:txBody>
@@ -168,8 +168,8 @@
         </p:nvSpPr>
         <p:spPr>
           <a:xfrm>
-            <a:off x="559991" y="2785743"/>
-            <a:ext cx="3359944" cy="1280533"/>
+            <a:off x="559991" y="1921087"/>
+            <a:ext cx="3359944" cy="883073"/>
           </a:xfrm>
         </p:spPr>
         <p:txBody>
@@ -238,7 +238,7 @@
           <a:p>
             <a:fld id="{8AFC8C3F-6026-4749-AD6B-D9FA96E56B61}" type="datetimeFigureOut">
               <a:rPr lang="en-US" smtClean="0"/>
-              <a:t>9/6/2016</a:t>
+              <a:t>9/6/16</a:t>
             </a:fld>
             <a:endParaRPr lang="en-US"/>
           </a:p>
@@ -408,7 +408,7 @@
           <a:p>
             <a:fld id="{8AFC8C3F-6026-4749-AD6B-D9FA96E56B61}" type="datetimeFigureOut">
               <a:rPr lang="en-US" smtClean="0"/>
-              <a:t>9/6/2016</a:t>
+              <a:t>9/6/16</a:t>
             </a:fld>
             <a:endParaRPr lang="en-US"/>
           </a:p>
@@ -498,8 +498,8 @@
         </p:nvSpPr>
         <p:spPr>
           <a:xfrm>
-            <a:off x="3205946" y="282380"/>
-            <a:ext cx="965984" cy="4494758"/>
+            <a:off x="3205946" y="194733"/>
+            <a:ext cx="965984" cy="3099647"/>
           </a:xfrm>
         </p:spPr>
         <p:txBody>
@@ -526,8 +526,8 @@
         </p:nvSpPr>
         <p:spPr>
           <a:xfrm>
-            <a:off x="307995" y="282380"/>
-            <a:ext cx="2841952" cy="4494758"/>
+            <a:off x="307995" y="194733"/>
+            <a:ext cx="2841952" cy="3099647"/>
           </a:xfrm>
         </p:spPr>
         <p:txBody>
@@ -588,7 +588,7 @@
           <a:p>
             <a:fld id="{8AFC8C3F-6026-4749-AD6B-D9FA96E56B61}" type="datetimeFigureOut">
               <a:rPr lang="en-US" smtClean="0"/>
-              <a:t>9/6/2016</a:t>
+              <a:t>9/6/16</a:t>
             </a:fld>
             <a:endParaRPr lang="en-US"/>
           </a:p>
@@ -758,7 +758,7 @@
           <a:p>
             <a:fld id="{8AFC8C3F-6026-4749-AD6B-D9FA96E56B61}" type="datetimeFigureOut">
               <a:rPr lang="en-US" smtClean="0"/>
-              <a:t>9/6/2016</a:t>
+              <a:t>9/6/16</a:t>
             </a:fld>
             <a:endParaRPr lang="en-US"/>
           </a:p>
@@ -848,8 +848,8 @@
         </p:nvSpPr>
         <p:spPr>
           <a:xfrm>
-            <a:off x="305662" y="1322278"/>
-            <a:ext cx="3863935" cy="2206249"/>
+            <a:off x="305663" y="911861"/>
+            <a:ext cx="3863935" cy="1521460"/>
           </a:xfrm>
         </p:spPr>
         <p:txBody>
@@ -880,8 +880,8 @@
         </p:nvSpPr>
         <p:spPr>
           <a:xfrm>
-            <a:off x="305662" y="3549399"/>
-            <a:ext cx="3863935" cy="1160214"/>
+            <a:off x="305663" y="2447714"/>
+            <a:ext cx="3863935" cy="800100"/>
           </a:xfrm>
         </p:spPr>
         <p:txBody>
@@ -1002,7 +1002,7 @@
           <a:p>
             <a:fld id="{8AFC8C3F-6026-4749-AD6B-D9FA96E56B61}" type="datetimeFigureOut">
               <a:rPr lang="en-US" smtClean="0"/>
-              <a:t>9/6/2016</a:t>
+              <a:t>9/6/16</a:t>
             </a:fld>
             <a:endParaRPr lang="en-US"/>
           </a:p>
@@ -1115,8 +1115,8 @@
         </p:nvSpPr>
         <p:spPr>
           <a:xfrm>
-            <a:off x="307995" y="1411902"/>
-            <a:ext cx="1903968" cy="3365236"/>
+            <a:off x="307995" y="973667"/>
+            <a:ext cx="1903968" cy="2320713"/>
           </a:xfrm>
         </p:spPr>
         <p:txBody>
@@ -1172,8 +1172,8 @@
         </p:nvSpPr>
         <p:spPr>
           <a:xfrm>
-            <a:off x="2267962" y="1411902"/>
-            <a:ext cx="1903968" cy="3365236"/>
+            <a:off x="2267962" y="973667"/>
+            <a:ext cx="1903968" cy="2320713"/>
           </a:xfrm>
         </p:spPr>
         <p:txBody>
@@ -1234,7 +1234,7 @@
           <a:p>
             <a:fld id="{8AFC8C3F-6026-4749-AD6B-D9FA96E56B61}" type="datetimeFigureOut">
               <a:rPr lang="en-US" smtClean="0"/>
-              <a:t>9/6/2016</a:t>
+              <a:t>9/6/16</a:t>
             </a:fld>
             <a:endParaRPr lang="en-US"/>
           </a:p>
@@ -1324,8 +1324,8 @@
         </p:nvSpPr>
         <p:spPr>
           <a:xfrm>
-            <a:off x="308579" y="282381"/>
-            <a:ext cx="3863935" cy="1025164"/>
+            <a:off x="308580" y="194734"/>
+            <a:ext cx="3863935" cy="706967"/>
           </a:xfrm>
         </p:spPr>
         <p:txBody>
@@ -1352,8 +1352,8 @@
         </p:nvSpPr>
         <p:spPr>
           <a:xfrm>
-            <a:off x="308579" y="1300177"/>
-            <a:ext cx="1895218" cy="637197"/>
+            <a:off x="308579" y="896620"/>
+            <a:ext cx="1895218" cy="439420"/>
           </a:xfrm>
         </p:spPr>
         <p:txBody>
@@ -1417,8 +1417,8 @@
         </p:nvSpPr>
         <p:spPr>
           <a:xfrm>
-            <a:off x="308579" y="1937374"/>
-            <a:ext cx="1895218" cy="2849586"/>
+            <a:off x="308579" y="1336040"/>
+            <a:ext cx="1895218" cy="1965114"/>
           </a:xfrm>
         </p:spPr>
         <p:txBody>
@@ -1474,8 +1474,8 @@
         </p:nvSpPr>
         <p:spPr>
           <a:xfrm>
-            <a:off x="2267962" y="1300177"/>
-            <a:ext cx="1904552" cy="637197"/>
+            <a:off x="2267962" y="896620"/>
+            <a:ext cx="1904552" cy="439420"/>
           </a:xfrm>
         </p:spPr>
         <p:txBody>
@@ -1539,8 +1539,8 @@
         </p:nvSpPr>
         <p:spPr>
           <a:xfrm>
-            <a:off x="2267962" y="1937374"/>
-            <a:ext cx="1904552" cy="2849586"/>
+            <a:off x="2267962" y="1336040"/>
+            <a:ext cx="1904552" cy="1965114"/>
           </a:xfrm>
         </p:spPr>
         <p:txBody>
@@ -1601,7 +1601,7 @@
           <a:p>
             <a:fld id="{8AFC8C3F-6026-4749-AD6B-D9FA96E56B61}" type="datetimeFigureOut">
               <a:rPr lang="en-US" smtClean="0"/>
-              <a:t>9/6/2016</a:t>
+              <a:t>9/6/16</a:t>
             </a:fld>
             <a:endParaRPr lang="en-US"/>
           </a:p>
@@ -1719,7 +1719,7 @@
           <a:p>
             <a:fld id="{8AFC8C3F-6026-4749-AD6B-D9FA96E56B61}" type="datetimeFigureOut">
               <a:rPr lang="en-US" smtClean="0"/>
-              <a:t>9/6/2016</a:t>
+              <a:t>9/6/16</a:t>
             </a:fld>
             <a:endParaRPr lang="en-US"/>
           </a:p>
@@ -1814,7 +1814,7 @@
           <a:p>
             <a:fld id="{8AFC8C3F-6026-4749-AD6B-D9FA96E56B61}" type="datetimeFigureOut">
               <a:rPr lang="en-US" smtClean="0"/>
-              <a:t>9/6/2016</a:t>
+              <a:t>9/6/16</a:t>
             </a:fld>
             <a:endParaRPr lang="en-US"/>
           </a:p>
@@ -1904,8 +1904,8 @@
         </p:nvSpPr>
         <p:spPr>
           <a:xfrm>
-            <a:off x="308579" y="353589"/>
-            <a:ext cx="1444892" cy="1237562"/>
+            <a:off x="308579" y="243840"/>
+            <a:ext cx="1444892" cy="853440"/>
           </a:xfrm>
         </p:spPr>
         <p:txBody>
@@ -1936,8 +1936,8 @@
         </p:nvSpPr>
         <p:spPr>
           <a:xfrm>
-            <a:off x="1904552" y="763655"/>
-            <a:ext cx="2267962" cy="3769163"/>
+            <a:off x="1904552" y="526627"/>
+            <a:ext cx="2267962" cy="2599267"/>
           </a:xfrm>
         </p:spPr>
         <p:txBody>
@@ -2021,8 +2021,8 @@
         </p:nvSpPr>
         <p:spPr>
           <a:xfrm>
-            <a:off x="308579" y="1591151"/>
-            <a:ext cx="1444892" cy="2947805"/>
+            <a:off x="308579" y="1097280"/>
+            <a:ext cx="1444892" cy="2032847"/>
           </a:xfrm>
         </p:spPr>
         <p:txBody>
@@ -2091,7 +2091,7 @@
           <a:p>
             <a:fld id="{8AFC8C3F-6026-4749-AD6B-D9FA96E56B61}" type="datetimeFigureOut">
               <a:rPr lang="en-US" smtClean="0"/>
-              <a:t>9/6/2016</a:t>
+              <a:t>9/6/16</a:t>
             </a:fld>
             <a:endParaRPr lang="en-US"/>
           </a:p>
@@ -2181,8 +2181,8 @@
         </p:nvSpPr>
         <p:spPr>
           <a:xfrm>
-            <a:off x="308579" y="353589"/>
-            <a:ext cx="1444892" cy="1237562"/>
+            <a:off x="308579" y="243840"/>
+            <a:ext cx="1444892" cy="853440"/>
           </a:xfrm>
         </p:spPr>
         <p:txBody>
@@ -2213,8 +2213,8 @@
         </p:nvSpPr>
         <p:spPr>
           <a:xfrm>
-            <a:off x="1904552" y="763655"/>
-            <a:ext cx="2267962" cy="3769163"/>
+            <a:off x="1904552" y="526627"/>
+            <a:ext cx="2267962" cy="2599267"/>
           </a:xfrm>
         </p:spPr>
         <p:txBody>
@@ -2278,8 +2278,8 @@
         </p:nvSpPr>
         <p:spPr>
           <a:xfrm>
-            <a:off x="308579" y="1591151"/>
-            <a:ext cx="1444892" cy="2947805"/>
+            <a:off x="308579" y="1097280"/>
+            <a:ext cx="1444892" cy="2032847"/>
           </a:xfrm>
         </p:spPr>
         <p:txBody>
@@ -2348,7 +2348,7 @@
           <a:p>
             <a:fld id="{8AFC8C3F-6026-4749-AD6B-D9FA96E56B61}" type="datetimeFigureOut">
               <a:rPr lang="en-US" smtClean="0"/>
-              <a:t>9/6/2016</a:t>
+              <a:t>9/6/16</a:t>
             </a:fld>
             <a:endParaRPr lang="en-US"/>
           </a:p>
@@ -2443,8 +2443,8 @@
         </p:nvSpPr>
         <p:spPr>
           <a:xfrm>
-            <a:off x="307995" y="282381"/>
-            <a:ext cx="3863935" cy="1025164"/>
+            <a:off x="307996" y="194734"/>
+            <a:ext cx="3863935" cy="706967"/>
           </a:xfrm>
           <a:prstGeom prst="rect">
             <a:avLst/>
@@ -2476,8 +2476,8 @@
         </p:nvSpPr>
         <p:spPr>
           <a:xfrm>
-            <a:off x="307995" y="1411902"/>
-            <a:ext cx="3863935" cy="3365236"/>
+            <a:off x="307996" y="973667"/>
+            <a:ext cx="3863935" cy="2320713"/>
           </a:xfrm>
           <a:prstGeom prst="rect">
             <a:avLst/>
@@ -2538,8 +2538,8 @@
         </p:nvSpPr>
         <p:spPr>
           <a:xfrm>
-            <a:off x="307995" y="4915873"/>
-            <a:ext cx="1007983" cy="282380"/>
+            <a:off x="307996" y="3390054"/>
+            <a:ext cx="1007983" cy="194733"/>
           </a:xfrm>
           <a:prstGeom prst="rect">
             <a:avLst/>
@@ -2561,7 +2561,7 @@
           <a:p>
             <a:fld id="{8AFC8C3F-6026-4749-AD6B-D9FA96E56B61}" type="datetimeFigureOut">
               <a:rPr lang="en-US" smtClean="0"/>
-              <a:t>9/6/2016</a:t>
+              <a:t>9/6/16</a:t>
             </a:fld>
             <a:endParaRPr lang="en-US"/>
           </a:p>
@@ -2579,8 +2579,8 @@
         </p:nvSpPr>
         <p:spPr>
           <a:xfrm>
-            <a:off x="1483975" y="4915873"/>
-            <a:ext cx="1511975" cy="282380"/>
+            <a:off x="1483976" y="3390054"/>
+            <a:ext cx="1511975" cy="194733"/>
           </a:xfrm>
           <a:prstGeom prst="rect">
             <a:avLst/>
@@ -2616,8 +2616,8 @@
         </p:nvSpPr>
         <p:spPr>
           <a:xfrm>
-            <a:off x="3163947" y="4915873"/>
-            <a:ext cx="1007983" cy="282380"/>
+            <a:off x="3163948" y="3390054"/>
+            <a:ext cx="1007983" cy="194733"/>
           </a:xfrm>
           <a:prstGeom prst="rect">
             <a:avLst/>
@@ -2968,7 +2968,7 @@
       </p:grpSpPr>
       <p:pic>
         <p:nvPicPr>
-          <p:cNvPr id="62" name="Picture 2" descr="https://lh3.googleusercontent.com/b6XwVkAj2K5o40tvA6oTOiKPNS0OrFY43i7IRjBUyoMs0xuz65GM3jzJc3c2IIdJSJ9w2F5nhaf8aCwKo62x3mH-pSNYm_U-exK4NV-bElGVCchJQgyMe313zeaIUKKRue0Ab5kT9tjMXbN3GxvV_t3gMugRAeZ8Ctu0gmRjUrc4Xaa5MqsFO9jWGX6wIw9dCkZkln5GluRmqwBF6y0QviF43TdXXrnYAjADVrSVTTvgy4-k9uNP9cav0zn33hiAiypVYUICeqeaIMVVR6M6dk2XyqGwacol3CN5Ik3bWCUgjdCG6w6o_N2mdSPYtkDjG-AtN3iK66pYc0VSapxJ1pPTG3GTFP5Il3hOotTyCWV9YQwCrVjf6HYfIjGMNQbHcvnDB6pXH6TCZAsyF1GMswDM9UXRx0tP3GJw0YB-oLhrja7pnpvH5c-n6zqwhf0uh2Zkq9ZA-u5RCzEjYyomtQjdmtRHNulpKRVptB0IFlCTY60p9c-F7L-vKx43kE3PHfWu7_LF9_FpP-o26UyOaSLNFhKAEl4_5fU6s30ExEFO524YzSQpcy178jf9jfnz8OZEmWeHDqTgBc5lhH8JSRijytTHwD-GsyVi_1GhkhRVAaaU=w672-h896-no"/>
+          <p:cNvPr id="3" name="Picture 2" descr="https://lh3.googleusercontent.com/b6XwVkAj2K5o40tvA6oTOiKPNS0OrFY43i7IRjBUyoMs0xuz65GM3jzJc3c2IIdJSJ9w2F5nhaf8aCwKo62x3mH-pSNYm_U-exK4NV-bElGVCchJQgyMe313zeaIUKKRue0Ab5kT9tjMXbN3GxvV_t3gMugRAeZ8Ctu0gmRjUrc4Xaa5MqsFO9jWGX6wIw9dCkZkln5GluRmqwBF6y0QviF43TdXXrnYAjADVrSVTTvgy4-k9uNP9cav0zn33hiAiypVYUICeqeaIMVVR6M6dk2XyqGwacol3CN5Ik3bWCUgjdCG6w6o_N2mdSPYtkDjG-AtN3iK66pYc0VSapxJ1pPTG3GTFP5Il3hOotTyCWV9YQwCrVjf6HYfIjGMNQbHcvnDB6pXH6TCZAsyF1GMswDM9UXRx0tP3GJw0YB-oLhrja7pnpvH5c-n6zqwhf0uh2Zkq9ZA-u5RCzEjYyomtQjdmtRHNulpKRVptB0IFlCTY60p9c-F7L-vKx43kE3PHfWu7_LF9_FpP-o26UyOaSLNFhKAEl4_5fU6s30ExEFO524YzSQpcy178jf9jfnz8OZEmWeHDqTgBc5lhH8JSRijytTHwD-GsyVi_1GhkhRVAaaU=w672-h896-no"/>
           <p:cNvPicPr>
             <a:picLocks noChangeAspect="1" noChangeArrowheads="1"/>
           </p:cNvPicPr>
@@ -2986,16 +2986,16 @@
           <a:stretch/>
         </p:blipFill>
         <p:spPr bwMode="auto">
-          <a:xfrm>
-            <a:off x="54593" y="45156"/>
-            <a:ext cx="4368800" cy="5222702"/>
+          <a:xfrm rot="5400000" flipH="1">
+            <a:off x="366230" y="-456096"/>
+            <a:ext cx="3747466" cy="4479925"/>
           </a:xfrm>
           <a:prstGeom prst="rect">
             <a:avLst/>
           </a:prstGeom>
           <a:noFill/>
           <a:extLst>
-            <a:ext uri="{909E8E84-426E-40DD-AFC4-6F175D3DCCD1}">
+            <a:ext uri="{909E8E84-426E-40dd-AFC4-6F175D3DCCD1}">
               <a14:hiddenFill xmlns:a14="http://schemas.microsoft.com/office/drawing/2010/main">
                 <a:solidFill>
                   <a:srgbClr val="FFFFFF"/>
@@ -3061,7 +3061,7 @@
     </a:clrScheme>
     <a:fontScheme name="Office Theme">
       <a:majorFont>
-        <a:latin typeface="Calibri Light" panose="020F0302020204030204"/>
+        <a:latin typeface="Calibri Light"/>
         <a:ea typeface=""/>
         <a:cs typeface=""/>
         <a:font script="Jpan" typeface="ＭＳ Ｐゴシック"/>
@@ -3096,7 +3096,7 @@
         <a:font script="Geor" typeface="Sylfaen"/>
       </a:majorFont>
       <a:minorFont>
-        <a:latin typeface="Calibri" panose="020F0502020204030204"/>
+        <a:latin typeface="Calibri"/>
         <a:ea typeface=""/>
         <a:cs typeface=""/>
         <a:font script="Jpan" typeface="ＭＳ Ｐゴシック"/>
@@ -3273,7 +3273,7 @@
   <a:extraClrSchemeLst/>
   <a:extLst>
     <a:ext uri="{05A4C25C-085E-4340-85A3-A5531E510DB2}">
-      <thm15:themeFamily xmlns:thm15="http://schemas.microsoft.com/office/thememl/2012/main" name="Office Theme" id="{62F939B6-93AF-4DB8-9C6B-D6C7DFDC589F}" vid="{4A3C46E8-61CC-4603-A589-7422A47A8E4A}"/>
+      <thm15:themeFamily xmlns:thm15="http://schemas.microsoft.com/office/thememl/2012/main" xmlns="" name="Office Theme" id="{62F939B6-93AF-4DB8-9C6B-D6C7DFDC589F}" vid="{4A3C46E8-61CC-4603-A589-7422A47A8E4A}"/>
     </a:ext>
   </a:extLst>
 </a:theme>

</xml_diff>